<commit_message>
add more general principles to ppt
</commit_message>
<xml_diff>
--- a/doc/Building a Shiny app.pptx
+++ b/doc/Building a Shiny app.pptx
@@ -6,8 +6,10 @@
   </p:sldMasterIdLst>
   <p:sldIdLst>
     <p:sldId id="276" r:id="rId5"/>
-    <p:sldId id="277" r:id="rId6"/>
-    <p:sldId id="278" r:id="rId7"/>
+    <p:sldId id="279" r:id="rId6"/>
+    <p:sldId id="277" r:id="rId7"/>
+    <p:sldId id="280" r:id="rId8"/>
+    <p:sldId id="278" r:id="rId9"/>
   </p:sldIdLst>
   <p:sldSz cx="12192000" cy="6858000"/>
   <p:notesSz cx="6858000" cy="9144000"/>
@@ -4337,7 +4339,7 @@
           <p:cNvPr id="2" name="Content Placeholder 1">
             <a:extLst>
               <a:ext uri="{FF2B5EF4-FFF2-40B4-BE49-F238E27FC236}">
-                <a16:creationId xmlns:a16="http://schemas.microsoft.com/office/drawing/2014/main" id="{B07B41A2-B232-E88E-60FF-2A017EE70308}"/>
+                <a16:creationId xmlns:a16="http://schemas.microsoft.com/office/drawing/2014/main" id="{63B068DA-AA91-AFBC-24FB-686D6AB7BDCC}"/>
               </a:ext>
             </a:extLst>
           </p:cNvPr>
@@ -4346,142 +4348,6 @@
           </p:cNvSpPr>
           <p:nvPr>
             <p:ph idx="1"/>
-          </p:nvPr>
-        </p:nvSpPr>
-        <p:spPr>
-          <a:xfrm>
-            <a:off x="1025624" y="1693579"/>
-            <a:ext cx="10515600" cy="4715533"/>
-          </a:xfrm>
-        </p:spPr>
-        <p:txBody>
-          <a:bodyPr>
-            <a:normAutofit fontScale="92500" lnSpcReduction="10000"/>
-          </a:bodyPr>
-          <a:lstStyle/>
-          <a:p>
-            <a:r>
-              <a:rPr lang="en-US" dirty="0"/>
-              <a:t>Put the Shiny app itself in a subfolder of the project </a:t>
-            </a:r>
-          </a:p>
-          <a:p>
-            <a:pPr lvl="1"/>
-            <a:r>
-              <a:rPr lang="en-US" dirty="0"/>
-              <a:t>With `data` and `www` subfolders (and R if you have functions defined)</a:t>
-            </a:r>
-          </a:p>
-          <a:p>
-            <a:pPr lvl="1"/>
-            <a:r>
-              <a:rPr lang="en-US" dirty="0"/>
-              <a:t>Always use </a:t>
-            </a:r>
-            <a:r>
-              <a:rPr lang="en-US" dirty="0" err="1"/>
-              <a:t>global.R</a:t>
-            </a:r>
-            <a:r>
-              <a:rPr lang="en-US" dirty="0"/>
-              <a:t>, </a:t>
-            </a:r>
-            <a:r>
-              <a:rPr lang="en-US" dirty="0" err="1"/>
-              <a:t>ui.R</a:t>
-            </a:r>
-            <a:r>
-              <a:rPr lang="en-US" dirty="0"/>
-              <a:t>, </a:t>
-            </a:r>
-            <a:r>
-              <a:rPr lang="en-US" dirty="0" err="1"/>
-              <a:t>server.R</a:t>
-            </a:r>
-            <a:r>
-              <a:rPr lang="en-US" dirty="0"/>
-              <a:t> structure</a:t>
-            </a:r>
-          </a:p>
-          <a:p>
-            <a:r>
-              <a:rPr lang="en-US" dirty="0"/>
-              <a:t>Push as much compute-intensive processing as possible into processing</a:t>
-            </a:r>
-          </a:p>
-          <a:p>
-            <a:pPr lvl="1"/>
-            <a:r>
-              <a:rPr lang="en-US" dirty="0"/>
-              <a:t>Load the minimal data and packages into the app itself, in the </a:t>
-            </a:r>
-            <a:r>
-              <a:rPr lang="en-US" dirty="0" err="1"/>
-              <a:t>global.R</a:t>
-            </a:r>
-            <a:r>
-              <a:rPr lang="en-US" dirty="0"/>
-              <a:t> script</a:t>
-            </a:r>
-          </a:p>
-          <a:p>
-            <a:r>
-              <a:rPr lang="en-US" dirty="0"/>
-              <a:t>Distinctive characteristics of a data web app:</a:t>
-            </a:r>
-          </a:p>
-          <a:p>
-            <a:pPr lvl="1"/>
-            <a:r>
-              <a:rPr lang="en-US" dirty="0"/>
-              <a:t>Macro-interactivity (e.g. user chooses from drop-down)</a:t>
-            </a:r>
-          </a:p>
-          <a:p>
-            <a:pPr lvl="1"/>
-            <a:r>
-              <a:rPr lang="en-US" dirty="0"/>
-              <a:t>Micro-interactivity (e.g. tooltips, zoom)</a:t>
-            </a:r>
-          </a:p>
-          <a:p>
-            <a:pPr lvl="1"/>
-            <a:r>
-              <a:rPr lang="en-US" dirty="0"/>
-              <a:t>Cross-talk (click on one graphic, influence another)</a:t>
-            </a:r>
-          </a:p>
-          <a:p>
-            <a:r>
-              <a:rPr lang="en-US" dirty="0"/>
-              <a:t>Don’t forget fonts, colours, general corporate style – learn some CSS</a:t>
-            </a:r>
-          </a:p>
-          <a:p>
-            <a:r>
-              <a:rPr lang="en-US" dirty="0"/>
-              <a:t>Shiny can use HTML and JS, no limits – and can use the server to write arbitrary HTML</a:t>
-            </a:r>
-          </a:p>
-          <a:p>
-            <a:endParaRPr lang="en-US" dirty="0"/>
-          </a:p>
-        </p:txBody>
-      </p:sp>
-      <p:sp>
-        <p:nvSpPr>
-          <p:cNvPr id="3" name="Title 2">
-            <a:extLst>
-              <a:ext uri="{FF2B5EF4-FFF2-40B4-BE49-F238E27FC236}">
-                <a16:creationId xmlns:a16="http://schemas.microsoft.com/office/drawing/2014/main" id="{477A1F0F-4F99-16AF-7DCD-B66E9FCEC0CA}"/>
-              </a:ext>
-            </a:extLst>
-          </p:cNvPr>
-          <p:cNvSpPr>
-            <a:spLocks noGrp="1"/>
-          </p:cNvSpPr>
-          <p:nvPr>
-            <p:ph type="title"/>
           </p:nvPr>
         </p:nvSpPr>
         <p:spPr/>
@@ -4490,8 +4356,130 @@
           <a:lstStyle/>
           <a:p>
             <a:r>
-              <a:rPr lang="en-US" dirty="0"/>
-              <a:t>Summary of what covered</a:t>
+              <a:rPr lang="en-AU" b="1" dirty="0"/>
+              <a:t>Well-designed </a:t>
+            </a:r>
+            <a:r>
+              <a:rPr lang="en-AU" dirty="0"/>
+              <a:t>presentation of interesting data – </a:t>
+            </a:r>
+            <a:r>
+              <a:rPr lang="en-AU" i="1" dirty="0"/>
+              <a:t>substance</a:t>
+            </a:r>
+            <a:r>
+              <a:rPr lang="en-AU" dirty="0"/>
+              <a:t>, </a:t>
+            </a:r>
+            <a:r>
+              <a:rPr lang="en-AU" i="1" dirty="0"/>
+              <a:t>statistics</a:t>
+            </a:r>
+            <a:r>
+              <a:rPr lang="en-AU" dirty="0"/>
+              <a:t>, and </a:t>
+            </a:r>
+            <a:r>
+              <a:rPr lang="en-AU" i="1" dirty="0"/>
+              <a:t>design</a:t>
+            </a:r>
+          </a:p>
+          <a:p>
+            <a:r>
+              <a:rPr lang="en-AU" b="1" dirty="0"/>
+              <a:t>Complex ideas </a:t>
+            </a:r>
+            <a:r>
+              <a:rPr lang="en-AU" dirty="0"/>
+              <a:t>communicated with </a:t>
+            </a:r>
+            <a:r>
+              <a:rPr lang="en-AU" i="1" dirty="0"/>
+              <a:t>clarity</a:t>
+            </a:r>
+            <a:r>
+              <a:rPr lang="en-AU" dirty="0"/>
+              <a:t>, </a:t>
+            </a:r>
+            <a:r>
+              <a:rPr lang="en-AU" i="1" dirty="0"/>
+              <a:t>precision</a:t>
+            </a:r>
+            <a:r>
+              <a:rPr lang="en-AU" dirty="0"/>
+              <a:t>, and </a:t>
+            </a:r>
+            <a:r>
+              <a:rPr lang="en-AU" i="1" dirty="0"/>
+              <a:t>efficiency</a:t>
+            </a:r>
+          </a:p>
+          <a:p>
+            <a:r>
+              <a:rPr lang="en-AU" b="1" dirty="0"/>
+              <a:t>Greatest number of ideas </a:t>
+            </a:r>
+            <a:r>
+              <a:rPr lang="en-AU" dirty="0"/>
+              <a:t>in the </a:t>
+            </a:r>
+            <a:r>
+              <a:rPr lang="en-AU" i="1" dirty="0"/>
+              <a:t>shortest time </a:t>
+            </a:r>
+            <a:r>
+              <a:rPr lang="en-AU" dirty="0"/>
+              <a:t>with the </a:t>
+            </a:r>
+            <a:r>
+              <a:rPr lang="en-AU" i="1" dirty="0"/>
+              <a:t>least ink </a:t>
+            </a:r>
+            <a:r>
+              <a:rPr lang="en-AU" dirty="0"/>
+              <a:t>in the </a:t>
+            </a:r>
+            <a:r>
+              <a:rPr lang="en-AU" i="1" dirty="0"/>
+              <a:t>smallest space</a:t>
+            </a:r>
+          </a:p>
+          <a:p>
+            <a:r>
+              <a:rPr lang="en-AU" b="1" dirty="0"/>
+              <a:t>Telling the truth </a:t>
+            </a:r>
+            <a:r>
+              <a:rPr lang="en-AU" dirty="0"/>
+              <a:t>about the data</a:t>
+            </a:r>
+          </a:p>
+        </p:txBody>
+      </p:sp>
+      <p:sp>
+        <p:nvSpPr>
+          <p:cNvPr id="3" name="Title 2">
+            <a:extLst>
+              <a:ext uri="{FF2B5EF4-FFF2-40B4-BE49-F238E27FC236}">
+                <a16:creationId xmlns:a16="http://schemas.microsoft.com/office/drawing/2014/main" id="{F62EF2D3-4346-A77F-562A-CE21A9221185}"/>
+              </a:ext>
+            </a:extLst>
+          </p:cNvPr>
+          <p:cNvSpPr>
+            <a:spLocks noGrp="1"/>
+          </p:cNvSpPr>
+          <p:nvPr>
+            <p:ph type="title"/>
+          </p:nvPr>
+        </p:nvSpPr>
+        <p:spPr/>
+        <p:txBody>
+          <a:bodyPr/>
+          <a:lstStyle/>
+          <a:p>
+            <a:r>
+              <a:rPr lang="en-AU" dirty="0"/>
+              <a:t>Broader principles to remember</a:t>
             </a:r>
           </a:p>
         </p:txBody>
@@ -4499,7 +4487,7 @@
     </p:spTree>
     <p:extLst>
       <p:ext uri="{BB962C8B-B14F-4D97-AF65-F5344CB8AC3E}">
-        <p14:creationId xmlns:p14="http://schemas.microsoft.com/office/powerpoint/2010/main" val="3501715572"/>
+        <p14:creationId xmlns:p14="http://schemas.microsoft.com/office/powerpoint/2010/main" val="1983407236"/>
       </p:ext>
     </p:extLst>
   </p:cSld>
@@ -4531,6 +4519,357 @@
           <p:cNvPr id="2" name="Content Placeholder 1">
             <a:extLst>
               <a:ext uri="{FF2B5EF4-FFF2-40B4-BE49-F238E27FC236}">
+                <a16:creationId xmlns:a16="http://schemas.microsoft.com/office/drawing/2014/main" id="{B07B41A2-B232-E88E-60FF-2A017EE70308}"/>
+              </a:ext>
+            </a:extLst>
+          </p:cNvPr>
+          <p:cNvSpPr>
+            <a:spLocks noGrp="1"/>
+          </p:cNvSpPr>
+          <p:nvPr>
+            <p:ph idx="1"/>
+          </p:nvPr>
+        </p:nvSpPr>
+        <p:spPr>
+          <a:xfrm>
+            <a:off x="1025624" y="1693579"/>
+            <a:ext cx="10515600" cy="4715533"/>
+          </a:xfrm>
+        </p:spPr>
+        <p:txBody>
+          <a:bodyPr>
+            <a:normAutofit fontScale="92500" lnSpcReduction="10000"/>
+          </a:bodyPr>
+          <a:lstStyle/>
+          <a:p>
+            <a:pPr marL="514350" indent="-514350">
+              <a:buFont typeface="+mj-lt"/>
+              <a:buAutoNum type="arabicPeriod"/>
+            </a:pPr>
+            <a:r>
+              <a:rPr lang="en-US" dirty="0"/>
+              <a:t>Put the Shiny app itself in a subfolder of the </a:t>
+            </a:r>
+            <a:r>
+              <a:rPr lang="en-US" dirty="0" err="1"/>
+              <a:t>Rstudio&amp;Git</a:t>
+            </a:r>
+            <a:r>
+              <a:rPr lang="en-US" dirty="0"/>
+              <a:t> </a:t>
+            </a:r>
+            <a:r>
+              <a:rPr lang="en-US" dirty="0" err="1"/>
+              <a:t>project&amp;repo</a:t>
+            </a:r>
+            <a:r>
+              <a:rPr lang="en-US" dirty="0"/>
+              <a:t> </a:t>
+            </a:r>
+          </a:p>
+          <a:p>
+            <a:pPr lvl="1"/>
+            <a:r>
+              <a:rPr lang="en-US" dirty="0"/>
+              <a:t>With `data` and `www` subfolders (and R if you have functions defined)</a:t>
+            </a:r>
+          </a:p>
+          <a:p>
+            <a:pPr lvl="1"/>
+            <a:r>
+              <a:rPr lang="en-US" dirty="0"/>
+              <a:t>Always use </a:t>
+            </a:r>
+            <a:r>
+              <a:rPr lang="en-US" dirty="0" err="1"/>
+              <a:t>global.R</a:t>
+            </a:r>
+            <a:r>
+              <a:rPr lang="en-US" dirty="0"/>
+              <a:t>, </a:t>
+            </a:r>
+            <a:r>
+              <a:rPr lang="en-US" dirty="0" err="1"/>
+              <a:t>ui.R</a:t>
+            </a:r>
+            <a:r>
+              <a:rPr lang="en-US" dirty="0"/>
+              <a:t>, </a:t>
+            </a:r>
+            <a:r>
+              <a:rPr lang="en-US" dirty="0" err="1"/>
+              <a:t>server.R</a:t>
+            </a:r>
+            <a:r>
+              <a:rPr lang="en-US" dirty="0"/>
+              <a:t> structure for the </a:t>
+            </a:r>
+            <a:r>
+              <a:rPr lang="en-US"/>
+              <a:t>app itself</a:t>
+            </a:r>
+            <a:endParaRPr lang="en-US" dirty="0"/>
+          </a:p>
+          <a:p>
+            <a:pPr marL="514350" indent="-514350">
+              <a:buFont typeface="+mj-lt"/>
+              <a:buAutoNum type="arabicPeriod"/>
+            </a:pPr>
+            <a:r>
+              <a:rPr lang="en-US" dirty="0"/>
+              <a:t>Push as much compute-intensive processing as possible into processing</a:t>
+            </a:r>
+          </a:p>
+          <a:p>
+            <a:pPr lvl="1"/>
+            <a:r>
+              <a:rPr lang="en-US" dirty="0"/>
+              <a:t>Load the minimal data and packages into the app itself, in the </a:t>
+            </a:r>
+            <a:r>
+              <a:rPr lang="en-US" dirty="0" err="1"/>
+              <a:t>global.R</a:t>
+            </a:r>
+            <a:r>
+              <a:rPr lang="en-US" dirty="0"/>
+              <a:t> script</a:t>
+            </a:r>
+          </a:p>
+          <a:p>
+            <a:pPr marL="514350" indent="-514350">
+              <a:buFont typeface="+mj-lt"/>
+              <a:buAutoNum type="arabicPeriod"/>
+            </a:pPr>
+            <a:r>
+              <a:rPr lang="en-US" dirty="0"/>
+              <a:t>Distinctive characteristics of a data web app:</a:t>
+            </a:r>
+          </a:p>
+          <a:p>
+            <a:pPr lvl="1"/>
+            <a:r>
+              <a:rPr lang="en-US" dirty="0"/>
+              <a:t>Macro-interactivity (e.g. user chooses from drop-down)</a:t>
+            </a:r>
+          </a:p>
+          <a:p>
+            <a:pPr lvl="1"/>
+            <a:r>
+              <a:rPr lang="en-US" dirty="0"/>
+              <a:t>Micro-interactivity (e.g. tooltips, zoom)</a:t>
+            </a:r>
+          </a:p>
+          <a:p>
+            <a:pPr lvl="1"/>
+            <a:r>
+              <a:rPr lang="en-US" dirty="0"/>
+              <a:t>Cross-talk (click on one graphic, influence another)</a:t>
+            </a:r>
+          </a:p>
+          <a:p>
+            <a:pPr marL="514350" indent="-514350">
+              <a:buFont typeface="+mj-lt"/>
+              <a:buAutoNum type="arabicPeriod"/>
+            </a:pPr>
+            <a:r>
+              <a:rPr lang="en-US" dirty="0"/>
+              <a:t>Don’t forget fonts, colours, general corporate style – learn some CSS</a:t>
+            </a:r>
+          </a:p>
+          <a:p>
+            <a:pPr marL="514350" indent="-514350">
+              <a:buFont typeface="+mj-lt"/>
+              <a:buAutoNum type="arabicPeriod"/>
+            </a:pPr>
+            <a:r>
+              <a:rPr lang="en-US" dirty="0"/>
+              <a:t>Shiny can use HTML and JS, no limits – and can use the server to write arbitrary HTML</a:t>
+            </a:r>
+          </a:p>
+          <a:p>
+            <a:endParaRPr lang="en-US" dirty="0"/>
+          </a:p>
+        </p:txBody>
+      </p:sp>
+      <p:sp>
+        <p:nvSpPr>
+          <p:cNvPr id="3" name="Title 2">
+            <a:extLst>
+              <a:ext uri="{FF2B5EF4-FFF2-40B4-BE49-F238E27FC236}">
+                <a16:creationId xmlns:a16="http://schemas.microsoft.com/office/drawing/2014/main" id="{477A1F0F-4F99-16AF-7DCD-B66E9FCEC0CA}"/>
+              </a:ext>
+            </a:extLst>
+          </p:cNvPr>
+          <p:cNvSpPr>
+            <a:spLocks noGrp="1"/>
+          </p:cNvSpPr>
+          <p:nvPr>
+            <p:ph type="title"/>
+          </p:nvPr>
+        </p:nvSpPr>
+        <p:spPr/>
+        <p:txBody>
+          <a:bodyPr/>
+          <a:lstStyle/>
+          <a:p>
+            <a:r>
+              <a:rPr lang="en-US" dirty="0"/>
+              <a:t>Summary of what covered in demo</a:t>
+            </a:r>
+          </a:p>
+        </p:txBody>
+      </p:sp>
+    </p:spTree>
+    <p:extLst>
+      <p:ext uri="{BB962C8B-B14F-4D97-AF65-F5344CB8AC3E}">
+        <p14:creationId xmlns:p14="http://schemas.microsoft.com/office/powerpoint/2010/main" val="3501715572"/>
+      </p:ext>
+    </p:extLst>
+  </p:cSld>
+  <p:clrMapOvr>
+    <a:masterClrMapping/>
+  </p:clrMapOvr>
+</p:sld>
+</file>
+
+<file path=ppt/slides/slide4.xml><?xml version="1.0" encoding="utf-8"?>
+<p:sld xmlns:a="http://schemas.openxmlformats.org/drawingml/2006/main" xmlns:r="http://schemas.openxmlformats.org/officeDocument/2006/relationships" xmlns:p="http://schemas.openxmlformats.org/presentationml/2006/main">
+  <p:cSld>
+    <p:spTree>
+      <p:nvGrpSpPr>
+        <p:cNvPr id="1" name=""/>
+        <p:cNvGrpSpPr/>
+        <p:nvPr/>
+      </p:nvGrpSpPr>
+      <p:grpSpPr>
+        <a:xfrm>
+          <a:off x="0" y="0"/>
+          <a:ext cx="0" cy="0"/>
+          <a:chOff x="0" y="0"/>
+          <a:chExt cx="0" cy="0"/>
+        </a:xfrm>
+      </p:grpSpPr>
+      <p:sp>
+        <p:nvSpPr>
+          <p:cNvPr id="2" name="Content Placeholder 1">
+            <a:extLst>
+              <a:ext uri="{FF2B5EF4-FFF2-40B4-BE49-F238E27FC236}">
+                <a16:creationId xmlns:a16="http://schemas.microsoft.com/office/drawing/2014/main" id="{63254395-3977-9CA7-0797-7CEDC0A78FF1}"/>
+              </a:ext>
+            </a:extLst>
+          </p:cNvPr>
+          <p:cNvSpPr>
+            <a:spLocks noGrp="1"/>
+          </p:cNvSpPr>
+          <p:nvPr>
+            <p:ph idx="1"/>
+          </p:nvPr>
+        </p:nvSpPr>
+        <p:spPr/>
+        <p:txBody>
+          <a:bodyPr/>
+          <a:lstStyle/>
+          <a:p>
+            <a:r>
+              <a:rPr lang="en-AU" dirty="0"/>
+              <a:t>Establish user needs, key questions level of understanding, constraints (bandwidth etc)</a:t>
+            </a:r>
+          </a:p>
+          <a:p>
+            <a:r>
+              <a:rPr lang="en-AU" dirty="0"/>
+              <a:t>Match to what the data can provide and establish rough scope of solution</a:t>
+            </a:r>
+          </a:p>
+          <a:p>
+            <a:r>
+              <a:rPr lang="en-AU" dirty="0"/>
+              <a:t>(Usually) prepare some static prototypes and iterate steps above</a:t>
+            </a:r>
+          </a:p>
+          <a:p>
+            <a:r>
+              <a:rPr lang="en-AU" dirty="0"/>
+              <a:t>Prepare macro-interactive working model and iterate with feedback</a:t>
+            </a:r>
+          </a:p>
+          <a:p>
+            <a:r>
+              <a:rPr lang="en-AU" dirty="0"/>
+              <a:t>Progressively polish, adding responsive design, styling, micro-interactivity, cross-talk , final polish – in roughly that order</a:t>
+            </a:r>
+          </a:p>
+          <a:p>
+            <a:r>
+              <a:rPr lang="en-AU" dirty="0"/>
+              <a:t>Always iterate with feedback – Agile not Waterfall</a:t>
+            </a:r>
+          </a:p>
+        </p:txBody>
+      </p:sp>
+      <p:sp>
+        <p:nvSpPr>
+          <p:cNvPr id="3" name="Title 2">
+            <a:extLst>
+              <a:ext uri="{FF2B5EF4-FFF2-40B4-BE49-F238E27FC236}">
+                <a16:creationId xmlns:a16="http://schemas.microsoft.com/office/drawing/2014/main" id="{EC801D7F-A56D-541D-516B-B18D0E847D98}"/>
+              </a:ext>
+            </a:extLst>
+          </p:cNvPr>
+          <p:cNvSpPr>
+            <a:spLocks noGrp="1"/>
+          </p:cNvSpPr>
+          <p:nvPr>
+            <p:ph type="title"/>
+          </p:nvPr>
+        </p:nvSpPr>
+        <p:spPr/>
+        <p:txBody>
+          <a:bodyPr/>
+          <a:lstStyle/>
+          <a:p>
+            <a:r>
+              <a:rPr lang="en-AU" dirty="0"/>
+              <a:t>An approach</a:t>
+            </a:r>
+          </a:p>
+        </p:txBody>
+      </p:sp>
+    </p:spTree>
+    <p:extLst>
+      <p:ext uri="{BB962C8B-B14F-4D97-AF65-F5344CB8AC3E}">
+        <p14:creationId xmlns:p14="http://schemas.microsoft.com/office/powerpoint/2010/main" val="3249525675"/>
+      </p:ext>
+    </p:extLst>
+  </p:cSld>
+  <p:clrMapOvr>
+    <a:masterClrMapping/>
+  </p:clrMapOvr>
+</p:sld>
+</file>
+
+<file path=ppt/slides/slide5.xml><?xml version="1.0" encoding="utf-8"?>
+<p:sld xmlns:a="http://schemas.openxmlformats.org/drawingml/2006/main" xmlns:r="http://schemas.openxmlformats.org/officeDocument/2006/relationships" xmlns:p="http://schemas.openxmlformats.org/presentationml/2006/main">
+  <p:cSld>
+    <p:spTree>
+      <p:nvGrpSpPr>
+        <p:cNvPr id="1" name=""/>
+        <p:cNvGrpSpPr/>
+        <p:nvPr/>
+      </p:nvGrpSpPr>
+      <p:grpSpPr>
+        <a:xfrm>
+          <a:off x="0" y="0"/>
+          <a:ext cx="0" cy="0"/>
+          <a:chOff x="0" y="0"/>
+          <a:chExt cx="0" cy="0"/>
+        </a:xfrm>
+      </p:grpSpPr>
+      <p:sp>
+        <p:nvSpPr>
+          <p:cNvPr id="2" name="Content Placeholder 1">
+            <a:extLst>
+              <a:ext uri="{FF2B5EF4-FFF2-40B4-BE49-F238E27FC236}">
                 <a16:creationId xmlns:a16="http://schemas.microsoft.com/office/drawing/2014/main" id="{F3D4CDC6-12CF-6EE6-96D1-2B17CCC1890D}"/>
               </a:ext>
             </a:extLst>
@@ -4544,7 +4883,9 @@
         </p:nvSpPr>
         <p:spPr/>
         <p:txBody>
-          <a:bodyPr/>
+          <a:bodyPr>
+            <a:normAutofit fontScale="92500" lnSpcReduction="10000"/>
+          </a:bodyPr>
           <a:lstStyle/>
           <a:p>
             <a:r>
@@ -4600,7 +4941,21 @@
           <a:p>
             <a:r>
               <a:rPr lang="en-AU" dirty="0"/>
-              <a:t>Built-in layouts now available </a:t>
+              <a:t>Layout options</a:t>
+            </a:r>
+          </a:p>
+          <a:p>
+            <a:pPr lvl="1"/>
+            <a:r>
+              <a:rPr lang="en-AU" dirty="0"/>
+              <a:t>Multiple tabs and pages</a:t>
+            </a:r>
+          </a:p>
+          <a:p>
+            <a:pPr lvl="1"/>
+            <a:r>
+              <a:rPr lang="en-AU" dirty="0"/>
+              <a:t>Built-in layouts available </a:t>
             </a:r>
             <a:r>
               <a:rPr lang="en-AU" dirty="0" err="1"/>
@@ -4612,15 +4967,11 @@
             </a:r>
           </a:p>
           <a:p>
+            <a:pPr lvl="1"/>
             <a:r>
               <a:rPr lang="en-AU" dirty="0"/>
-              <a:t>Fundamentals of “bootstrap” approach to responsive web </a:t>
-            </a:r>
-            <a:r>
-              <a:rPr lang="en-AU" dirty="0" err="1"/>
-              <a:t>desitn</a:t>
-            </a:r>
-            <a:endParaRPr lang="en-AU" dirty="0"/>
+              <a:t>Fundamentals of “bootstrap” approach to responsive web design</a:t>
+            </a:r>
           </a:p>
           <a:p>
             <a:r>
@@ -4664,7 +5015,7 @@
           <a:p>
             <a:r>
               <a:rPr lang="en-AU" dirty="0"/>
-              <a:t>Things not covered</a:t>
+              <a:t>Things not covered to lookup</a:t>
             </a:r>
           </a:p>
         </p:txBody>
@@ -4978,6 +5329,28 @@
 </file>
 
 <file path=customXml/item1.xml><?xml version="1.0" encoding="utf-8"?>
+<?mso-contentType ?>
+<FormTemplates xmlns="http://schemas.microsoft.com/sharepoint/v3/contenttype/forms">
+  <Display>DocumentLibraryForm</Display>
+  <Edit>DocumentLibraryForm</Edit>
+  <New>DocumentLibraryForm</New>
+</FormTemplates>
+</file>
+
+<file path=customXml/item2.xml><?xml version="1.0" encoding="utf-8"?>
+<p:properties xmlns:p="http://schemas.microsoft.com/office/2006/metadata/properties" xmlns:xsi="http://www.w3.org/2001/XMLSchema-instance" xmlns:pc="http://schemas.microsoft.com/office/infopath/2007/PartnerControls">
+  <documentManagement>
+    <TaxCatchAll xmlns="1644aaaf-76d5-4a97-8df4-1ac44f24cfd9" xsi:nil="true"/>
+    <lcf76f155ced4ddcb4097134ff3c332f xmlns="8429cdef-8c4a-4b4f-a5bd-9a657e45f834">
+      <Terms xmlns="http://schemas.microsoft.com/office/infopath/2007/PartnerControls"/>
+    </lcf76f155ced4ddcb4097134ff3c332f>
+    <PublishingExpirationDate xmlns="http://schemas.microsoft.com/sharepoint/v3" xsi:nil="true"/>
+    <PublishingStartDate xmlns="http://schemas.microsoft.com/sharepoint/v3" xsi:nil="true"/>
+  </documentManagement>
+</p:properties>
+</file>
+
+<file path=customXml/item3.xml><?xml version="1.0" encoding="utf-8"?>
 <ct:contentTypeSchema xmlns:ct="http://schemas.microsoft.com/office/2006/metadata/contentType" xmlns:ma="http://schemas.microsoft.com/office/2006/metadata/properties/metaAttributes" ct:_="" ma:_="" ma:contentTypeName="Document" ma:contentTypeID="0x010100C85AAC2F25D61348B8922E59BDF82BAD" ma:contentTypeVersion="16" ma:contentTypeDescription="Create a new document." ma:contentTypeScope="" ma:versionID="fc497a70cc3de4b4baad45e0ef3fdc3b">
   <xsd:schema xmlns:xsd="http://www.w3.org/2001/XMLSchema" xmlns:xs="http://www.w3.org/2001/XMLSchema" xmlns:p="http://schemas.microsoft.com/office/2006/metadata/properties" xmlns:ns1="http://schemas.microsoft.com/sharepoint/v3" xmlns:ns2="8429cdef-8c4a-4b4f-a5bd-9a657e45f834" xmlns:ns3="fe0e20ed-f52e-4993-be80-54db2a133aca" xmlns:ns4="1644aaaf-76d5-4a97-8df4-1ac44f24cfd9" targetNamespace="http://schemas.microsoft.com/office/2006/metadata/properties" ma:root="true" ma:fieldsID="54d1022210cd15832b1e3515874fd266" ns1:_="" ns2:_="" ns3:_="" ns4:_="">
     <xsd:import namespace="http://schemas.microsoft.com/sharepoint/v3"/>
@@ -5236,45 +5609,10 @@
 </ct:contentTypeSchema>
 </file>
 
-<file path=customXml/item2.xml><?xml version="1.0" encoding="utf-8"?>
-<p:properties xmlns:p="http://schemas.microsoft.com/office/2006/metadata/properties" xmlns:xsi="http://www.w3.org/2001/XMLSchema-instance" xmlns:pc="http://schemas.microsoft.com/office/infopath/2007/PartnerControls">
-  <documentManagement>
-    <TaxCatchAll xmlns="1644aaaf-76d5-4a97-8df4-1ac44f24cfd9" xsi:nil="true"/>
-    <lcf76f155ced4ddcb4097134ff3c332f xmlns="8429cdef-8c4a-4b4f-a5bd-9a657e45f834">
-      <Terms xmlns="http://schemas.microsoft.com/office/infopath/2007/PartnerControls"/>
-    </lcf76f155ced4ddcb4097134ff3c332f>
-    <PublishingExpirationDate xmlns="http://schemas.microsoft.com/sharepoint/v3" xsi:nil="true"/>
-    <PublishingStartDate xmlns="http://schemas.microsoft.com/sharepoint/v3" xsi:nil="true"/>
-  </documentManagement>
-</p:properties>
-</file>
-
-<file path=customXml/item3.xml><?xml version="1.0" encoding="utf-8"?>
-<?mso-contentType ?>
-<FormTemplates xmlns="http://schemas.microsoft.com/sharepoint/v3/contenttype/forms">
-  <Display>DocumentLibraryForm</Display>
-  <Edit>DocumentLibraryForm</Edit>
-  <New>DocumentLibraryForm</New>
-</FormTemplates>
-</file>
-
 <file path=customXml/itemProps1.xml><?xml version="1.0" encoding="utf-8"?>
-<ds:datastoreItem xmlns:ds="http://schemas.openxmlformats.org/officeDocument/2006/customXml" ds:itemID="{45508E41-647C-4FB4-9A86-C768FA85A4DD}">
+<ds:datastoreItem xmlns:ds="http://schemas.openxmlformats.org/officeDocument/2006/customXml" ds:itemID="{57D86592-F64F-4784-9AC1-23AEE8436EED}">
   <ds:schemaRefs>
-    <ds:schemaRef ds:uri="http://schemas.microsoft.com/office/2006/metadata/contentType"/>
-    <ds:schemaRef ds:uri="http://schemas.microsoft.com/office/2006/metadata/properties/metaAttributes"/>
-    <ds:schemaRef ds:uri="http://www.w3.org/2001/XMLSchema"/>
-    <ds:schemaRef ds:uri="http://schemas.microsoft.com/office/2006/metadata/properties"/>
-    <ds:schemaRef ds:uri="http://schemas.microsoft.com/sharepoint/v3"/>
-    <ds:schemaRef ds:uri="8429cdef-8c4a-4b4f-a5bd-9a657e45f834"/>
-    <ds:schemaRef ds:uri="fe0e20ed-f52e-4993-be80-54db2a133aca"/>
-    <ds:schemaRef ds:uri="1644aaaf-76d5-4a97-8df4-1ac44f24cfd9"/>
-    <ds:schemaRef ds:uri="http://schemas.microsoft.com/office/2006/documentManagement/types"/>
-    <ds:schemaRef ds:uri="http://schemas.microsoft.com/office/infopath/2007/PartnerControls"/>
-    <ds:schemaRef ds:uri="http://schemas.openxmlformats.org/package/2006/metadata/core-properties"/>
-    <ds:schemaRef ds:uri="http://purl.org/dc/elements/1.1/"/>
-    <ds:schemaRef ds:uri="http://purl.org/dc/terms/"/>
-    <ds:schemaRef ds:uri="http://schemas.microsoft.com/internal/obd"/>
+    <ds:schemaRef ds:uri="http://schemas.microsoft.com/sharepoint/v3/contenttype/forms"/>
   </ds:schemaRefs>
 </ds:datastoreItem>
 </file>
@@ -5300,9 +5638,22 @@
 </file>
 
 <file path=customXml/itemProps3.xml><?xml version="1.0" encoding="utf-8"?>
-<ds:datastoreItem xmlns:ds="http://schemas.openxmlformats.org/officeDocument/2006/customXml" ds:itemID="{57D86592-F64F-4784-9AC1-23AEE8436EED}">
+<ds:datastoreItem xmlns:ds="http://schemas.openxmlformats.org/officeDocument/2006/customXml" ds:itemID="{45508E41-647C-4FB4-9A86-C768FA85A4DD}">
   <ds:schemaRefs>
-    <ds:schemaRef ds:uri="http://schemas.microsoft.com/sharepoint/v3/contenttype/forms"/>
+    <ds:schemaRef ds:uri="http://schemas.microsoft.com/office/2006/metadata/contentType"/>
+    <ds:schemaRef ds:uri="http://schemas.microsoft.com/office/2006/metadata/properties/metaAttributes"/>
+    <ds:schemaRef ds:uri="http://www.w3.org/2001/XMLSchema"/>
+    <ds:schemaRef ds:uri="http://schemas.microsoft.com/office/2006/metadata/properties"/>
+    <ds:schemaRef ds:uri="http://schemas.microsoft.com/sharepoint/v3"/>
+    <ds:schemaRef ds:uri="8429cdef-8c4a-4b4f-a5bd-9a657e45f834"/>
+    <ds:schemaRef ds:uri="fe0e20ed-f52e-4993-be80-54db2a133aca"/>
+    <ds:schemaRef ds:uri="1644aaaf-76d5-4a97-8df4-1ac44f24cfd9"/>
+    <ds:schemaRef ds:uri="http://schemas.microsoft.com/office/2006/documentManagement/types"/>
+    <ds:schemaRef ds:uri="http://schemas.microsoft.com/office/infopath/2007/PartnerControls"/>
+    <ds:schemaRef ds:uri="http://schemas.openxmlformats.org/package/2006/metadata/core-properties"/>
+    <ds:schemaRef ds:uri="http://purl.org/dc/elements/1.1/"/>
+    <ds:schemaRef ds:uri="http://purl.org/dc/terms/"/>
+    <ds:schemaRef ds:uri="http://schemas.microsoft.com/internal/obd"/>
   </ds:schemaRefs>
 </ds:datastoreItem>
 </file>
</xml_diff>